<commit_message>
Updated Logic Command Class Diagram
</commit_message>
<xml_diff>
--- a/docs/diagrams/LogicComponentCommandClassDiagram.pptx
+++ b/docs/diagrams/LogicComponentCommandClassDiagram.pptx
@@ -126,10 +126,6 @@
 </p:presentation>
 </file>
 
-<file path=ppt/revisionInfo.xml><?xml version="1.0" encoding="utf-8"?>
-<p1510:revInfo xmlns:a="http://schemas.openxmlformats.org/drawingml/2006/main" xmlns:r="http://schemas.openxmlformats.org/officeDocument/2006/relationships" xmlns:p1510="http://schemas.microsoft.com/office/powerpoint/2015/10/main"/>
-</file>
-
 <file path=ppt/notesMasters/notesMaster1.xml><?xml version="1.0" encoding="utf-8"?>
 <p:notesMaster xmlns:a="http://schemas.openxmlformats.org/drawingml/2006/main" xmlns:r="http://schemas.openxmlformats.org/officeDocument/2006/relationships" xmlns:p="http://schemas.openxmlformats.org/presentationml/2006/main">
   <p:cSld>
@@ -212,7 +208,7 @@
           <a:p>
             <a:fld id="{F5CC4B3F-88C1-4FFA-B1B6-F41C21DC6924}" type="datetimeFigureOut">
               <a:rPr lang="en-US" smtClean="0"/>
-              <a:t>7/21/17</a:t>
+              <a:t>3/20/2018</a:t>
             </a:fld>
             <a:endParaRPr lang="en-US"/>
           </a:p>
@@ -658,7 +654,7 @@
           <a:p>
             <a:fld id="{78C97017-6FC3-485B-9764-EAC9E56C1D49}" type="datetimeFigureOut">
               <a:rPr lang="en-US" smtClean="0"/>
-              <a:t>7/21/17</a:t>
+              <a:t>3/20/2018</a:t>
             </a:fld>
             <a:endParaRPr lang="en-US"/>
           </a:p>
@@ -826,7 +822,7 @@
           <a:p>
             <a:fld id="{78C97017-6FC3-485B-9764-EAC9E56C1D49}" type="datetimeFigureOut">
               <a:rPr lang="en-US" smtClean="0"/>
-              <a:t>7/21/17</a:t>
+              <a:t>3/20/2018</a:t>
             </a:fld>
             <a:endParaRPr lang="en-US"/>
           </a:p>
@@ -1004,7 +1000,7 @@
           <a:p>
             <a:fld id="{78C97017-6FC3-485B-9764-EAC9E56C1D49}" type="datetimeFigureOut">
               <a:rPr lang="en-US" smtClean="0"/>
-              <a:t>7/21/17</a:t>
+              <a:t>3/20/2018</a:t>
             </a:fld>
             <a:endParaRPr lang="en-US"/>
           </a:p>
@@ -1172,7 +1168,7 @@
           <a:p>
             <a:fld id="{78C97017-6FC3-485B-9764-EAC9E56C1D49}" type="datetimeFigureOut">
               <a:rPr lang="en-US" smtClean="0"/>
-              <a:t>7/21/17</a:t>
+              <a:t>3/20/2018</a:t>
             </a:fld>
             <a:endParaRPr lang="en-US"/>
           </a:p>
@@ -1417,7 +1413,7 @@
           <a:p>
             <a:fld id="{78C97017-6FC3-485B-9764-EAC9E56C1D49}" type="datetimeFigureOut">
               <a:rPr lang="en-US" smtClean="0"/>
-              <a:t>7/21/17</a:t>
+              <a:t>3/20/2018</a:t>
             </a:fld>
             <a:endParaRPr lang="en-US"/>
           </a:p>
@@ -1702,7 +1698,7 @@
           <a:p>
             <a:fld id="{78C97017-6FC3-485B-9764-EAC9E56C1D49}" type="datetimeFigureOut">
               <a:rPr lang="en-US" smtClean="0"/>
-              <a:t>7/21/17</a:t>
+              <a:t>3/20/2018</a:t>
             </a:fld>
             <a:endParaRPr lang="en-US"/>
           </a:p>
@@ -2121,7 +2117,7 @@
           <a:p>
             <a:fld id="{78C97017-6FC3-485B-9764-EAC9E56C1D49}" type="datetimeFigureOut">
               <a:rPr lang="en-US" smtClean="0"/>
-              <a:t>7/21/17</a:t>
+              <a:t>3/20/2018</a:t>
             </a:fld>
             <a:endParaRPr lang="en-US"/>
           </a:p>
@@ -2238,7 +2234,7 @@
           <a:p>
             <a:fld id="{78C97017-6FC3-485B-9764-EAC9E56C1D49}" type="datetimeFigureOut">
               <a:rPr lang="en-US" smtClean="0"/>
-              <a:t>7/21/17</a:t>
+              <a:t>3/20/2018</a:t>
             </a:fld>
             <a:endParaRPr lang="en-US"/>
           </a:p>
@@ -2333,7 +2329,7 @@
           <a:p>
             <a:fld id="{78C97017-6FC3-485B-9764-EAC9E56C1D49}" type="datetimeFigureOut">
               <a:rPr lang="en-US" smtClean="0"/>
-              <a:t>7/21/17</a:t>
+              <a:t>3/20/2018</a:t>
             </a:fld>
             <a:endParaRPr lang="en-US"/>
           </a:p>
@@ -2608,7 +2604,7 @@
           <a:p>
             <a:fld id="{78C97017-6FC3-485B-9764-EAC9E56C1D49}" type="datetimeFigureOut">
               <a:rPr lang="en-US" smtClean="0"/>
-              <a:t>7/21/17</a:t>
+              <a:t>3/20/2018</a:t>
             </a:fld>
             <a:endParaRPr lang="en-US"/>
           </a:p>
@@ -2860,7 +2856,7 @@
           <a:p>
             <a:fld id="{78C97017-6FC3-485B-9764-EAC9E56C1D49}" type="datetimeFigureOut">
               <a:rPr lang="en-US" smtClean="0"/>
-              <a:t>7/21/17</a:t>
+              <a:t>3/20/2018</a:t>
             </a:fld>
             <a:endParaRPr lang="en-US"/>
           </a:p>
@@ -3071,7 +3067,7 @@
           <a:p>
             <a:fld id="{78C97017-6FC3-485B-9764-EAC9E56C1D49}" type="datetimeFigureOut">
               <a:rPr lang="en-US" smtClean="0"/>
-              <a:t>7/21/17</a:t>
+              <a:t>3/20/2018</a:t>
             </a:fld>
             <a:endParaRPr lang="en-US"/>
           </a:p>
@@ -3507,8 +3503,8 @@
         </p:nvSpPr>
         <p:spPr>
           <a:xfrm>
-            <a:off x="3124200" y="1600200"/>
-            <a:ext cx="5486400" cy="2819400"/>
+            <a:off x="2557294" y="1600200"/>
+            <a:ext cx="6358106" cy="2819400"/>
           </a:xfrm>
           <a:prstGeom prst="roundRect">
             <a:avLst>
@@ -3635,6 +3631,7 @@
         <p:nvCxnSpPr>
           <p:cNvPr id="96" name="Elbow Connector 95"/>
           <p:cNvCxnSpPr>
+            <a:cxnSpLocks/>
             <a:stCxn id="12" idx="1"/>
             <a:endCxn id="144" idx="1"/>
           </p:cNvCxnSpPr>
@@ -3718,14 +3715,6 @@
               </a:rPr>
               <a:t>{abstract}</a:t>
             </a:r>
-            <a:r>
-              <a:rPr lang="en-US" sz="1050" b="1">
-                <a:solidFill>
-                  <a:srgbClr val="0070C0"/>
-                </a:solidFill>
-              </a:rPr>
-              <a:t/>
-            </a:r>
             <a:br>
               <a:rPr lang="en-US" sz="1050" b="1">
                 <a:solidFill>
@@ -3734,7 +3723,7 @@
               </a:rPr>
             </a:br>
             <a:r>
-              <a:rPr lang="en-US" sz="1050" b="1" smtClean="0">
+              <a:rPr lang="en-US" sz="1050" b="1">
                 <a:solidFill>
                   <a:srgbClr val="0070C0"/>
                 </a:solidFill>
@@ -3745,7 +3734,7 @@
           <a:p>
             <a:pPr algn="ctr"/>
             <a:r>
-              <a:rPr lang="en-US" sz="1050" b="1" dirty="0" smtClean="0">
+              <a:rPr lang="en-US" sz="1050" b="1" dirty="0">
                 <a:solidFill>
                   <a:srgbClr val="0070C0"/>
                 </a:solidFill>
@@ -3861,8 +3850,8 @@
         </p:nvSpPr>
         <p:spPr>
           <a:xfrm flipH="1">
-            <a:off x="7239001" y="2997128"/>
-            <a:ext cx="1175193" cy="359669"/>
+            <a:off x="7238999" y="2997128"/>
+            <a:ext cx="1447798" cy="359669"/>
           </a:xfrm>
           <a:prstGeom prst="rect">
             <a:avLst/>
@@ -3894,12 +3883,12 @@
           <a:p>
             <a:pPr algn="ctr"/>
             <a:r>
-              <a:rPr lang="en-US" sz="1050" b="1" smtClean="0">
+              <a:rPr lang="en-US" sz="1050" b="1" dirty="0" err="1">
                 <a:solidFill>
                   <a:srgbClr val="0070C0"/>
                 </a:solidFill>
               </a:rPr>
-              <a:t>AddCommand</a:t>
+              <a:t>AddPersonCommand</a:t>
             </a:r>
             <a:endParaRPr lang="en-US" sz="1050" b="1" dirty="0">
               <a:solidFill>
@@ -3918,7 +3907,7 @@
         <p:spPr>
           <a:xfrm flipH="1">
             <a:off x="7239000" y="3431436"/>
-            <a:ext cx="1175194" cy="359669"/>
+            <a:ext cx="1447800" cy="359669"/>
           </a:xfrm>
           <a:prstGeom prst="rect">
             <a:avLst/>
@@ -3950,12 +3939,12 @@
           <a:p>
             <a:pPr algn="ctr"/>
             <a:r>
-              <a:rPr lang="en-US" sz="1050" b="1" dirty="0" err="1" smtClean="0">
+              <a:rPr lang="en-US" sz="1050" b="1" dirty="0" err="1">
                 <a:solidFill>
                   <a:srgbClr val="0070C0"/>
                 </a:solidFill>
               </a:rPr>
-              <a:t>ClearCommand</a:t>
+              <a:t>ClearPersonCommand</a:t>
             </a:r>
             <a:endParaRPr lang="en-US" sz="1050" b="1" dirty="0">
               <a:solidFill>
@@ -3973,8 +3962,8 @@
         </p:nvSpPr>
         <p:spPr>
           <a:xfrm flipH="1">
-            <a:off x="7239000" y="3906103"/>
-            <a:ext cx="1175194" cy="359669"/>
+            <a:off x="7238999" y="3906103"/>
+            <a:ext cx="1447797" cy="359669"/>
           </a:xfrm>
           <a:prstGeom prst="rect">
             <a:avLst/>
@@ -4006,7 +3995,7 @@
           <a:p>
             <a:pPr algn="ctr"/>
             <a:r>
-              <a:rPr lang="mr-IN" sz="1050" b="1" dirty="0" smtClean="0">
+              <a:rPr lang="mr-IN" sz="1050" b="1" dirty="0">
                 <a:solidFill>
                   <a:srgbClr val="0070C0"/>
                 </a:solidFill>
@@ -4025,6 +4014,7 @@
         <p:nvCxnSpPr>
           <p:cNvPr id="129" name="Elbow Connector 128"/>
           <p:cNvCxnSpPr>
+            <a:cxnSpLocks/>
             <a:stCxn id="76" idx="3"/>
             <a:endCxn id="128" idx="3"/>
           </p:cNvCxnSpPr>
@@ -4033,7 +4023,7 @@
         <p:spPr>
           <a:xfrm>
             <a:off x="6182243" y="2769430"/>
-            <a:ext cx="1056757" cy="1316508"/>
+            <a:ext cx="1056756" cy="1316508"/>
           </a:xfrm>
           <a:prstGeom prst="bentConnector3">
             <a:avLst>
@@ -4064,6 +4054,7 @@
         <p:nvCxnSpPr>
           <p:cNvPr id="131" name="Elbow Connector 130"/>
           <p:cNvCxnSpPr>
+            <a:cxnSpLocks/>
             <a:stCxn id="76" idx="3"/>
             <a:endCxn id="113" idx="3"/>
           </p:cNvCxnSpPr>
@@ -4103,6 +4094,7 @@
         <p:nvCxnSpPr>
           <p:cNvPr id="134" name="Elbow Connector 133"/>
           <p:cNvCxnSpPr>
+            <a:cxnSpLocks/>
             <a:stCxn id="76" idx="3"/>
             <a:endCxn id="107" idx="3"/>
           </p:cNvCxnSpPr>
@@ -4111,7 +4103,7 @@
         <p:spPr>
           <a:xfrm>
             <a:off x="6182243" y="2769430"/>
-            <a:ext cx="1056758" cy="407533"/>
+            <a:ext cx="1056756" cy="407533"/>
           </a:xfrm>
           <a:prstGeom prst="bentConnector3">
             <a:avLst>
@@ -4200,8 +4192,8 @@
         </p:nvSpPr>
         <p:spPr>
           <a:xfrm flipH="1">
-            <a:off x="3329336" y="2488769"/>
-            <a:ext cx="1175193" cy="359669"/>
+            <a:off x="3049433" y="2488769"/>
+            <a:ext cx="1455096" cy="359669"/>
           </a:xfrm>
           <a:prstGeom prst="rect">
             <a:avLst/>
@@ -4233,12 +4225,12 @@
           <a:p>
             <a:pPr algn="ctr"/>
             <a:r>
-              <a:rPr lang="en-US" sz="1050" b="1" smtClean="0">
+              <a:rPr lang="en-US" sz="1050" b="1" dirty="0" err="1">
                 <a:solidFill>
                   <a:srgbClr val="0070C0"/>
                 </a:solidFill>
               </a:rPr>
-              <a:t>FindCommand</a:t>
+              <a:t>FindPersonCommand</a:t>
             </a:r>
             <a:endParaRPr lang="en-US" sz="1050" b="1" dirty="0">
               <a:solidFill>
@@ -4256,8 +4248,8 @@
         </p:nvSpPr>
         <p:spPr>
           <a:xfrm flipH="1">
-            <a:off x="3329336" y="2944348"/>
-            <a:ext cx="1175193" cy="359669"/>
+            <a:off x="3049433" y="2944348"/>
+            <a:ext cx="1455096" cy="359669"/>
           </a:xfrm>
           <a:prstGeom prst="rect">
             <a:avLst/>
@@ -4289,7 +4281,7 @@
           <a:p>
             <a:pPr algn="ctr"/>
             <a:r>
-              <a:rPr lang="en-US" sz="1050" b="1" dirty="0" err="1" smtClean="0">
+              <a:rPr lang="en-US" sz="1050" b="1" dirty="0" err="1">
                 <a:solidFill>
                   <a:srgbClr val="0070C0"/>
                 </a:solidFill>
@@ -4308,6 +4300,7 @@
         <p:nvCxnSpPr>
           <p:cNvPr id="150" name="Elbow Connector 149"/>
           <p:cNvCxnSpPr>
+            <a:cxnSpLocks/>
             <a:stCxn id="12" idx="1"/>
             <a:endCxn id="145" idx="1"/>
           </p:cNvCxnSpPr>
@@ -4351,8 +4344,8 @@
         </p:nvSpPr>
         <p:spPr>
           <a:xfrm flipH="1">
-            <a:off x="3328030" y="3396703"/>
-            <a:ext cx="1175194" cy="359669"/>
+            <a:off x="3048128" y="3396703"/>
+            <a:ext cx="1455096" cy="359669"/>
           </a:xfrm>
           <a:prstGeom prst="rect">
             <a:avLst/>
@@ -4384,7 +4377,7 @@
           <a:p>
             <a:pPr algn="ctr"/>
             <a:r>
-              <a:rPr lang="mr-IN" sz="1050" b="1" dirty="0" smtClean="0">
+              <a:rPr lang="mr-IN" sz="1050" b="1" dirty="0">
                 <a:solidFill>
                   <a:srgbClr val="0070C0"/>
                 </a:solidFill>
@@ -4403,6 +4396,7 @@
         <p:nvCxnSpPr>
           <p:cNvPr id="168" name="Elbow Connector 167"/>
           <p:cNvCxnSpPr>
+            <a:cxnSpLocks/>
             <a:stCxn id="12" idx="1"/>
             <a:endCxn id="167" idx="1"/>
           </p:cNvCxnSpPr>
@@ -4533,7 +4527,7 @@
           <a:p>
             <a:pPr algn="ctr"/>
             <a:r>
-              <a:rPr lang="en-US" sz="1050" b="1" dirty="0" err="1" smtClean="0">
+              <a:rPr lang="en-US" sz="1050" b="1" dirty="0" err="1">
                 <a:solidFill>
                   <a:srgbClr val="0070C0"/>
                 </a:solidFill>
@@ -4715,7 +4709,7 @@
         <p:nvCxnSpPr>
           <p:cNvPr id="30" name="Elbow Connector 25"/>
           <p:cNvCxnSpPr>
-            <a:stCxn id="2" idx="1"/>
+            <a:cxnSpLocks/>
             <a:endCxn id="25" idx="3"/>
           </p:cNvCxnSpPr>
           <p:nvPr/>
@@ -4723,7 +4717,7 @@
         <p:spPr>
           <a:xfrm flipH="1" flipV="1">
             <a:off x="2143762" y="3000131"/>
-            <a:ext cx="980438" cy="9769"/>
+            <a:ext cx="413532" cy="4120"/>
           </a:xfrm>
           <a:prstGeom prst="straightConnector1">
             <a:avLst/>

</xml_diff>